<commit_message>
Update Investor Presentation v2.pptx
</commit_message>
<xml_diff>
--- a/INVESTOR PRESENTATIONS/Investor Presentation v2.pptx
+++ b/INVESTOR PRESENTATIONS/Investor Presentation v2.pptx
@@ -4088,7 +4088,7 @@
           <a:p>
             <a:fld id="{EAE0E171-47B9-407F-A091-9894B1315CD8}" type="datetimeFigureOut">
               <a:rPr lang="tr-TR" smtClean="0"/>
-              <a:t>2.01.2024</a:t>
+              <a:t>4.01.2024</a:t>
             </a:fld>
             <a:endParaRPr lang="tr-TR"/>
           </a:p>
@@ -4286,7 +4286,7 @@
           <a:p>
             <a:fld id="{EAE0E171-47B9-407F-A091-9894B1315CD8}" type="datetimeFigureOut">
               <a:rPr lang="tr-TR" smtClean="0"/>
-              <a:t>2.01.2024</a:t>
+              <a:t>4.01.2024</a:t>
             </a:fld>
             <a:endParaRPr lang="tr-TR"/>
           </a:p>
@@ -4494,7 +4494,7 @@
           <a:p>
             <a:fld id="{EAE0E171-47B9-407F-A091-9894B1315CD8}" type="datetimeFigureOut">
               <a:rPr lang="tr-TR" smtClean="0"/>
-              <a:t>2.01.2024</a:t>
+              <a:t>4.01.2024</a:t>
             </a:fld>
             <a:endParaRPr lang="tr-TR"/>
           </a:p>
@@ -4692,7 +4692,7 @@
           <a:p>
             <a:fld id="{EAE0E171-47B9-407F-A091-9894B1315CD8}" type="datetimeFigureOut">
               <a:rPr lang="tr-TR" smtClean="0"/>
-              <a:t>2.01.2024</a:t>
+              <a:t>4.01.2024</a:t>
             </a:fld>
             <a:endParaRPr lang="tr-TR"/>
           </a:p>
@@ -4967,7 +4967,7 @@
           <a:p>
             <a:fld id="{EAE0E171-47B9-407F-A091-9894B1315CD8}" type="datetimeFigureOut">
               <a:rPr lang="tr-TR" smtClean="0"/>
-              <a:t>2.01.2024</a:t>
+              <a:t>4.01.2024</a:t>
             </a:fld>
             <a:endParaRPr lang="tr-TR"/>
           </a:p>
@@ -5232,7 +5232,7 @@
           <a:p>
             <a:fld id="{EAE0E171-47B9-407F-A091-9894B1315CD8}" type="datetimeFigureOut">
               <a:rPr lang="tr-TR" smtClean="0"/>
-              <a:t>2.01.2024</a:t>
+              <a:t>4.01.2024</a:t>
             </a:fld>
             <a:endParaRPr lang="tr-TR"/>
           </a:p>
@@ -5644,7 +5644,7 @@
           <a:p>
             <a:fld id="{EAE0E171-47B9-407F-A091-9894B1315CD8}" type="datetimeFigureOut">
               <a:rPr lang="tr-TR" smtClean="0"/>
-              <a:t>2.01.2024</a:t>
+              <a:t>4.01.2024</a:t>
             </a:fld>
             <a:endParaRPr lang="tr-TR"/>
           </a:p>
@@ -5785,7 +5785,7 @@
           <a:p>
             <a:fld id="{EAE0E171-47B9-407F-A091-9894B1315CD8}" type="datetimeFigureOut">
               <a:rPr lang="tr-TR" smtClean="0"/>
-              <a:t>2.01.2024</a:t>
+              <a:t>4.01.2024</a:t>
             </a:fld>
             <a:endParaRPr lang="tr-TR"/>
           </a:p>
@@ -5898,7 +5898,7 @@
           <a:p>
             <a:fld id="{EAE0E171-47B9-407F-A091-9894B1315CD8}" type="datetimeFigureOut">
               <a:rPr lang="tr-TR" smtClean="0"/>
-              <a:t>2.01.2024</a:t>
+              <a:t>4.01.2024</a:t>
             </a:fld>
             <a:endParaRPr lang="tr-TR"/>
           </a:p>
@@ -6209,7 +6209,7 @@
           <a:p>
             <a:fld id="{EAE0E171-47B9-407F-A091-9894B1315CD8}" type="datetimeFigureOut">
               <a:rPr lang="tr-TR" smtClean="0"/>
-              <a:t>2.01.2024</a:t>
+              <a:t>4.01.2024</a:t>
             </a:fld>
             <a:endParaRPr lang="tr-TR"/>
           </a:p>
@@ -6497,7 +6497,7 @@
           <a:p>
             <a:fld id="{EAE0E171-47B9-407F-A091-9894B1315CD8}" type="datetimeFigureOut">
               <a:rPr lang="tr-TR" smtClean="0"/>
-              <a:t>2.01.2024</a:t>
+              <a:t>4.01.2024</a:t>
             </a:fld>
             <a:endParaRPr lang="tr-TR"/>
           </a:p>
@@ -6738,7 +6738,7 @@
           <a:p>
             <a:fld id="{EAE0E171-47B9-407F-A091-9894B1315CD8}" type="datetimeFigureOut">
               <a:rPr lang="tr-TR" smtClean="0"/>
-              <a:t>2.01.2024</a:t>
+              <a:t>4.01.2024</a:t>
             </a:fld>
             <a:endParaRPr lang="tr-TR"/>
           </a:p>
@@ -11136,8 +11136,8 @@
         </p:nvCxnSpPr>
         <p:spPr>
           <a:xfrm>
-            <a:off x="8292134" y="5781266"/>
-            <a:ext cx="3278331" cy="0"/>
+            <a:off x="8676794" y="5781266"/>
+            <a:ext cx="2893671" cy="0"/>
           </a:xfrm>
           <a:prstGeom prst="straightConnector1">
             <a:avLst/>
@@ -11176,7 +11176,7 @@
         </p:nvSpPr>
         <p:spPr>
           <a:xfrm>
-            <a:off x="7255318" y="1549628"/>
+            <a:off x="7377504" y="1598301"/>
             <a:ext cx="1727200" cy="369332"/>
           </a:xfrm>
           <a:prstGeom prst="rect">
@@ -11194,6 +11194,84 @@
               <a:rPr lang="tr-TR" dirty="0"/>
               <a:t>MHI on BIST30</a:t>
             </a:r>
+          </a:p>
+        </p:txBody>
+      </p:sp>
+      <p:pic>
+        <p:nvPicPr>
+          <p:cNvPr id="9" name="Resim 8">
+            <a:extLst>
+              <a:ext uri="{FF2B5EF4-FFF2-40B4-BE49-F238E27FC236}">
+                <a16:creationId xmlns:a16="http://schemas.microsoft.com/office/drawing/2014/main" id="{AEF789D1-1EAD-8814-B9B0-7AB7E4ED9240}"/>
+              </a:ext>
+            </a:extLst>
+          </p:cNvPr>
+          <p:cNvPicPr>
+            <a:picLocks noChangeAspect="1"/>
+          </p:cNvPicPr>
+          <p:nvPr/>
+        </p:nvPicPr>
+        <p:blipFill>
+          <a:blip r:embed="rId4"/>
+          <a:stretch>
+            <a:fillRect/>
+          </a:stretch>
+        </p:blipFill>
+        <p:spPr>
+          <a:xfrm>
+            <a:off x="234749" y="4420118"/>
+            <a:ext cx="3717501" cy="1703591"/>
+          </a:xfrm>
+          <a:prstGeom prst="rect">
+            <a:avLst/>
+          </a:prstGeom>
+        </p:spPr>
+      </p:pic>
+      <p:sp>
+        <p:nvSpPr>
+          <p:cNvPr id="15" name="Metin kutusu 14">
+            <a:extLst>
+              <a:ext uri="{FF2B5EF4-FFF2-40B4-BE49-F238E27FC236}">
+                <a16:creationId xmlns:a16="http://schemas.microsoft.com/office/drawing/2014/main" id="{0734D69C-EE45-CBD9-1F10-3A2FFF4B409D}"/>
+              </a:ext>
+            </a:extLst>
+          </p:cNvPr>
+          <p:cNvSpPr txBox="1"/>
+          <p:nvPr/>
+        </p:nvSpPr>
+        <p:spPr>
+          <a:xfrm>
+            <a:off x="126844" y="4083118"/>
+            <a:ext cx="2098207" cy="369332"/>
+          </a:xfrm>
+          <a:prstGeom prst="rect">
+            <a:avLst/>
+          </a:prstGeom>
+          <a:noFill/>
+        </p:spPr>
+        <p:txBody>
+          <a:bodyPr wrap="square">
+            <a:spAutoFit/>
+          </a:bodyPr>
+          <a:lstStyle/>
+          <a:p>
+            <a:r>
+              <a:rPr lang="tr-TR" dirty="0"/>
+              <a:t>BIST100 – </a:t>
+            </a:r>
+            <a:r>
+              <a:rPr lang="tr-TR" dirty="0" err="1"/>
+              <a:t>last</a:t>
+            </a:r>
+            <a:r>
+              <a:rPr lang="tr-TR" dirty="0"/>
+              <a:t> 1 </a:t>
+            </a:r>
+            <a:r>
+              <a:rPr lang="tr-TR" dirty="0" err="1"/>
+              <a:t>year</a:t>
+            </a:r>
+            <a:endParaRPr lang="tr-TR" dirty="0"/>
           </a:p>
         </p:txBody>
       </p:sp>

</xml_diff>